<commit_message>
bad example minor change
</commit_message>
<xml_diff>
--- a/static/images/bad_examples/primitives.pptx
+++ b/static/images/bad_examples/primitives.pptx
@@ -107,6 +107,11 @@
       </a:defRPr>
     </a:lvl9pPr>
   </p:defaultTextStyle>
+  <p:extLst>
+    <p:ext uri="{EFAFB233-063F-42B5-8137-9DF3F51BA10A}">
+      <p15:sldGuideLst xmlns:p15="http://schemas.microsoft.com/office/powerpoint/2012/main"/>
+    </p:ext>
+  </p:extLst>
 </p:presentation>
 </file>
 
@@ -2975,10 +2980,10 @@
         </p:nvGrpSpPr>
         <p:grpSpPr>
           <a:xfrm>
-            <a:off x="1347105" y="127328"/>
-            <a:ext cx="9642024" cy="6730672"/>
-            <a:chOff x="1118506" y="706994"/>
-            <a:chExt cx="7371961" cy="4838144"/>
+            <a:off x="1347105" y="0"/>
+            <a:ext cx="9642024" cy="6858000"/>
+            <a:chOff x="1118506" y="615468"/>
+            <a:chExt cx="7371961" cy="4929670"/>
           </a:xfrm>
         </p:grpSpPr>
         <p:pic>
@@ -3018,8 +3023,8 @@
           </p:nvSpPr>
           <p:spPr>
             <a:xfrm>
-              <a:off x="2167813" y="2911000"/>
-              <a:ext cx="301686" cy="369332"/>
+              <a:off x="1903168" y="2880665"/>
+              <a:ext cx="749333" cy="508843"/>
             </a:xfrm>
             <a:prstGeom prst="rect">
               <a:avLst/>
@@ -3033,10 +3038,10 @@
             <a:lstStyle/>
             <a:p>
               <a:r>
-                <a:rPr lang="en-US" dirty="0" smtClean="0"/>
-                <a:t>1</a:t>
+                <a:rPr lang="en-US" sz="4000" dirty="0" smtClean="0"/>
+                <a:t>Left</a:t>
               </a:r>
-              <a:endParaRPr lang="en-US" dirty="0"/>
+              <a:endParaRPr lang="en-US" sz="4000" dirty="0"/>
             </a:p>
           </p:txBody>
         </p:sp>
@@ -3048,8 +3053,8 @@
           </p:nvSpPr>
           <p:spPr>
             <a:xfrm>
-              <a:off x="4572000" y="706994"/>
-              <a:ext cx="301686" cy="369332"/>
+              <a:off x="4447157" y="615468"/>
+              <a:ext cx="710555" cy="508843"/>
             </a:xfrm>
             <a:prstGeom prst="rect">
               <a:avLst/>
@@ -3063,10 +3068,10 @@
             <a:lstStyle/>
             <a:p>
               <a:r>
-                <a:rPr lang="en-US" dirty="0"/>
-                <a:t>2</a:t>
+                <a:rPr lang="en-US" sz="4000" dirty="0" smtClean="0"/>
+                <a:t>Top</a:t>
               </a:r>
-              <a:endParaRPr lang="en-US" dirty="0"/>
+              <a:endParaRPr lang="en-US" sz="4000" dirty="0"/>
             </a:p>
           </p:txBody>
         </p:sp>
@@ -3078,8 +3083,8 @@
           </p:nvSpPr>
           <p:spPr>
             <a:xfrm>
-              <a:off x="7208283" y="2915865"/>
-              <a:ext cx="301686" cy="369332"/>
+              <a:off x="6793185" y="2880665"/>
+              <a:ext cx="962392" cy="508843"/>
             </a:xfrm>
             <a:prstGeom prst="rect">
               <a:avLst/>
@@ -3093,10 +3098,10 @@
             <a:lstStyle/>
             <a:p>
               <a:r>
-                <a:rPr lang="en-US" dirty="0" smtClean="0"/>
-                <a:t>3</a:t>
+                <a:rPr lang="en-US" sz="4000" dirty="0" smtClean="0"/>
+                <a:t>Right</a:t>
               </a:r>
-              <a:endParaRPr lang="en-US" dirty="0"/>
+              <a:endParaRPr lang="en-US" sz="4000" dirty="0"/>
             </a:p>
           </p:txBody>
         </p:sp>
@@ -3145,13 +3150,13 @@
                 </a:ext>
               </a:extLst>
             </a:blip>
-            <a:srcRect l="64941" t="31762" r="7916" b="35142"/>
+            <a:srcRect l="64941" t="33880" r="7916" b="35141"/>
             <a:stretch/>
           </p:blipFill>
           <p:spPr>
             <a:xfrm>
-              <a:off x="6008523" y="3275467"/>
-              <a:ext cx="2481944" cy="2269671"/>
+              <a:off x="6008523" y="3420685"/>
+              <a:ext cx="2481944" cy="2124453"/>
             </a:xfrm>
             <a:prstGeom prst="rect">
               <a:avLst/>
@@ -3289,10 +3294,10 @@
         </p:nvGrpSpPr>
         <p:grpSpPr>
           <a:xfrm>
-            <a:off x="1232806" y="0"/>
-            <a:ext cx="9878786" cy="6787821"/>
-            <a:chOff x="1232806" y="706994"/>
-            <a:chExt cx="7257661" cy="4838144"/>
+            <a:off x="1232806" y="453575"/>
+            <a:ext cx="9878786" cy="6334246"/>
+            <a:chOff x="1232806" y="1030288"/>
+            <a:chExt cx="7257661" cy="4514850"/>
           </a:xfrm>
         </p:grpSpPr>
         <p:pic>
@@ -3324,96 +3329,6 @@
             </a:prstGeom>
           </p:spPr>
         </p:pic>
-        <p:sp>
-          <p:nvSpPr>
-            <p:cNvPr id="5" name="TextBox 4"/>
-            <p:cNvSpPr txBox="1"/>
-            <p:nvPr/>
-          </p:nvSpPr>
-          <p:spPr>
-            <a:xfrm>
-              <a:off x="2167813" y="2911000"/>
-              <a:ext cx="301686" cy="369332"/>
-            </a:xfrm>
-            <a:prstGeom prst="rect">
-              <a:avLst/>
-            </a:prstGeom>
-            <a:noFill/>
-          </p:spPr>
-          <p:txBody>
-            <a:bodyPr wrap="none" rtlCol="0">
-              <a:spAutoFit/>
-            </a:bodyPr>
-            <a:lstStyle/>
-            <a:p>
-              <a:r>
-                <a:rPr lang="en-US" dirty="0" smtClean="0"/>
-                <a:t>1</a:t>
-              </a:r>
-              <a:endParaRPr lang="en-US" dirty="0"/>
-            </a:p>
-          </p:txBody>
-        </p:sp>
-        <p:sp>
-          <p:nvSpPr>
-            <p:cNvPr id="6" name="TextBox 5"/>
-            <p:cNvSpPr txBox="1"/>
-            <p:nvPr/>
-          </p:nvSpPr>
-          <p:spPr>
-            <a:xfrm>
-              <a:off x="4572000" y="706994"/>
-              <a:ext cx="301686" cy="369332"/>
-            </a:xfrm>
-            <a:prstGeom prst="rect">
-              <a:avLst/>
-            </a:prstGeom>
-            <a:noFill/>
-          </p:spPr>
-          <p:txBody>
-            <a:bodyPr wrap="none" rtlCol="0">
-              <a:spAutoFit/>
-            </a:bodyPr>
-            <a:lstStyle/>
-            <a:p>
-              <a:r>
-                <a:rPr lang="en-US" dirty="0"/>
-                <a:t>2</a:t>
-              </a:r>
-              <a:endParaRPr lang="en-US" dirty="0"/>
-            </a:p>
-          </p:txBody>
-        </p:sp>
-        <p:sp>
-          <p:nvSpPr>
-            <p:cNvPr id="7" name="TextBox 6"/>
-            <p:cNvSpPr txBox="1"/>
-            <p:nvPr/>
-          </p:nvSpPr>
-          <p:spPr>
-            <a:xfrm>
-              <a:off x="7208283" y="2915865"/>
-              <a:ext cx="301686" cy="369332"/>
-            </a:xfrm>
-            <a:prstGeom prst="rect">
-              <a:avLst/>
-            </a:prstGeom>
-            <a:noFill/>
-          </p:spPr>
-          <p:txBody>
-            <a:bodyPr wrap="none" rtlCol="0">
-              <a:spAutoFit/>
-            </a:bodyPr>
-            <a:lstStyle/>
-            <a:p>
-              <a:r>
-                <a:rPr lang="en-US" dirty="0" smtClean="0"/>
-                <a:t>3</a:t>
-              </a:r>
-              <a:endParaRPr lang="en-US" dirty="0"/>
-            </a:p>
-          </p:txBody>
-        </p:sp>
         <p:pic>
           <p:nvPicPr>
             <p:cNvPr id="8" name="Picture 7"/>
@@ -3652,6 +3567,111 @@
           </p:spPr>
         </p:pic>
       </p:grpSp>
+      <p:grpSp>
+        <p:nvGrpSpPr>
+          <p:cNvPr id="3" name="Group 2"/>
+          <p:cNvGrpSpPr/>
+          <p:nvPr/>
+        </p:nvGrpSpPr>
+        <p:grpSpPr>
+          <a:xfrm>
+            <a:off x="2220774" y="-115053"/>
+            <a:ext cx="7807168" cy="3974209"/>
+            <a:chOff x="2220774" y="-115053"/>
+            <a:chExt cx="7807168" cy="3974209"/>
+          </a:xfrm>
+        </p:grpSpPr>
+        <p:sp>
+          <p:nvSpPr>
+            <p:cNvPr id="15" name="TextBox 14"/>
+            <p:cNvSpPr txBox="1"/>
+            <p:nvPr/>
+          </p:nvSpPr>
+          <p:spPr>
+            <a:xfrm>
+              <a:off x="5518600" y="-115053"/>
+              <a:ext cx="929358" cy="707886"/>
+            </a:xfrm>
+            <a:prstGeom prst="rect">
+              <a:avLst/>
+            </a:prstGeom>
+            <a:noFill/>
+          </p:spPr>
+          <p:txBody>
+            <a:bodyPr wrap="none" rtlCol="0">
+              <a:spAutoFit/>
+            </a:bodyPr>
+            <a:lstStyle/>
+            <a:p>
+              <a:r>
+                <a:rPr lang="en-US" sz="4000" dirty="0" smtClean="0"/>
+                <a:t>Top</a:t>
+              </a:r>
+              <a:endParaRPr lang="en-US" sz="4000" dirty="0"/>
+            </a:p>
+          </p:txBody>
+        </p:sp>
+        <p:sp>
+          <p:nvSpPr>
+            <p:cNvPr id="16" name="TextBox 15"/>
+            <p:cNvSpPr txBox="1"/>
+            <p:nvPr/>
+          </p:nvSpPr>
+          <p:spPr>
+            <a:xfrm>
+              <a:off x="2220774" y="3107534"/>
+              <a:ext cx="980077" cy="707886"/>
+            </a:xfrm>
+            <a:prstGeom prst="rect">
+              <a:avLst/>
+            </a:prstGeom>
+            <a:noFill/>
+          </p:spPr>
+          <p:txBody>
+            <a:bodyPr wrap="none" rtlCol="0">
+              <a:spAutoFit/>
+            </a:bodyPr>
+            <a:lstStyle/>
+            <a:p>
+              <a:r>
+                <a:rPr lang="en-US" sz="4000" dirty="0" smtClean="0"/>
+                <a:t>Left</a:t>
+              </a:r>
+              <a:endParaRPr lang="en-US" sz="4000" dirty="0"/>
+            </a:p>
+          </p:txBody>
+        </p:sp>
+        <p:sp>
+          <p:nvSpPr>
+            <p:cNvPr id="17" name="TextBox 16"/>
+            <p:cNvSpPr txBox="1"/>
+            <p:nvPr/>
+          </p:nvSpPr>
+          <p:spPr>
+            <a:xfrm>
+              <a:off x="8769199" y="3151270"/>
+              <a:ext cx="1258743" cy="707886"/>
+            </a:xfrm>
+            <a:prstGeom prst="rect">
+              <a:avLst/>
+            </a:prstGeom>
+            <a:noFill/>
+          </p:spPr>
+          <p:txBody>
+            <a:bodyPr wrap="none" rtlCol="0">
+              <a:spAutoFit/>
+            </a:bodyPr>
+            <a:lstStyle/>
+            <a:p>
+              <a:r>
+                <a:rPr lang="en-US" sz="4000" dirty="0" smtClean="0"/>
+                <a:t>Right</a:t>
+              </a:r>
+              <a:endParaRPr lang="en-US" sz="4000" dirty="0"/>
+            </a:p>
+          </p:txBody>
+        </p:sp>
+      </p:grpSp>
     </p:spTree>
     <p:extLst>
       <p:ext uri="{BB962C8B-B14F-4D97-AF65-F5344CB8AC3E}">
@@ -3690,10 +3710,10 @@
         </p:nvGrpSpPr>
         <p:grpSpPr>
           <a:xfrm>
-            <a:off x="1424665" y="0"/>
-            <a:ext cx="9344028" cy="6768193"/>
-            <a:chOff x="1261381" y="706994"/>
-            <a:chExt cx="7229086" cy="4778500"/>
+            <a:off x="1424665" y="607973"/>
+            <a:ext cx="9344028" cy="6160220"/>
+            <a:chOff x="1261381" y="1136237"/>
+            <a:chExt cx="7229086" cy="4349257"/>
           </a:xfrm>
         </p:grpSpPr>
         <p:pic>
@@ -3725,96 +3745,6 @@
             </a:prstGeom>
           </p:spPr>
         </p:pic>
-        <p:sp>
-          <p:nvSpPr>
-            <p:cNvPr id="5" name="TextBox 4"/>
-            <p:cNvSpPr txBox="1"/>
-            <p:nvPr/>
-          </p:nvSpPr>
-          <p:spPr>
-            <a:xfrm>
-              <a:off x="2167813" y="2911000"/>
-              <a:ext cx="301686" cy="369332"/>
-            </a:xfrm>
-            <a:prstGeom prst="rect">
-              <a:avLst/>
-            </a:prstGeom>
-            <a:noFill/>
-          </p:spPr>
-          <p:txBody>
-            <a:bodyPr wrap="none" rtlCol="0">
-              <a:spAutoFit/>
-            </a:bodyPr>
-            <a:lstStyle/>
-            <a:p>
-              <a:r>
-                <a:rPr lang="en-US" dirty="0" smtClean="0"/>
-                <a:t>1</a:t>
-              </a:r>
-              <a:endParaRPr lang="en-US" dirty="0"/>
-            </a:p>
-          </p:txBody>
-        </p:sp>
-        <p:sp>
-          <p:nvSpPr>
-            <p:cNvPr id="6" name="TextBox 5"/>
-            <p:cNvSpPr txBox="1"/>
-            <p:nvPr/>
-          </p:nvSpPr>
-          <p:spPr>
-            <a:xfrm>
-              <a:off x="4572000" y="706994"/>
-              <a:ext cx="301686" cy="369332"/>
-            </a:xfrm>
-            <a:prstGeom prst="rect">
-              <a:avLst/>
-            </a:prstGeom>
-            <a:noFill/>
-          </p:spPr>
-          <p:txBody>
-            <a:bodyPr wrap="none" rtlCol="0">
-              <a:spAutoFit/>
-            </a:bodyPr>
-            <a:lstStyle/>
-            <a:p>
-              <a:r>
-                <a:rPr lang="en-US" dirty="0"/>
-                <a:t>2</a:t>
-              </a:r>
-              <a:endParaRPr lang="en-US" dirty="0"/>
-            </a:p>
-          </p:txBody>
-        </p:sp>
-        <p:sp>
-          <p:nvSpPr>
-            <p:cNvPr id="7" name="TextBox 6"/>
-            <p:cNvSpPr txBox="1"/>
-            <p:nvPr/>
-          </p:nvSpPr>
-          <p:spPr>
-            <a:xfrm>
-              <a:off x="7208283" y="2915865"/>
-              <a:ext cx="301686" cy="369332"/>
-            </a:xfrm>
-            <a:prstGeom prst="rect">
-              <a:avLst/>
-            </a:prstGeom>
-            <a:noFill/>
-          </p:spPr>
-          <p:txBody>
-            <a:bodyPr wrap="none" rtlCol="0">
-              <a:spAutoFit/>
-            </a:bodyPr>
-            <a:lstStyle/>
-            <a:p>
-              <a:r>
-                <a:rPr lang="en-US" dirty="0" smtClean="0"/>
-                <a:t>3</a:t>
-              </a:r>
-              <a:endParaRPr lang="en-US" dirty="0"/>
-            </a:p>
-          </p:txBody>
-        </p:sp>
         <p:sp>
           <p:nvSpPr>
             <p:cNvPr id="10" name="Rectangle 9"/>
@@ -3966,6 +3896,111 @@
           </p:spPr>
         </p:pic>
       </p:grpSp>
+      <p:grpSp>
+        <p:nvGrpSpPr>
+          <p:cNvPr id="12" name="Group 11"/>
+          <p:cNvGrpSpPr/>
+          <p:nvPr/>
+        </p:nvGrpSpPr>
+        <p:grpSpPr>
+          <a:xfrm>
+            <a:off x="2212610" y="-98647"/>
+            <a:ext cx="7807168" cy="3974209"/>
+            <a:chOff x="2220774" y="-115053"/>
+            <a:chExt cx="7807168" cy="3974209"/>
+          </a:xfrm>
+        </p:grpSpPr>
+        <p:sp>
+          <p:nvSpPr>
+            <p:cNvPr id="13" name="TextBox 12"/>
+            <p:cNvSpPr txBox="1"/>
+            <p:nvPr/>
+          </p:nvSpPr>
+          <p:spPr>
+            <a:xfrm>
+              <a:off x="5518600" y="-115053"/>
+              <a:ext cx="929358" cy="707886"/>
+            </a:xfrm>
+            <a:prstGeom prst="rect">
+              <a:avLst/>
+            </a:prstGeom>
+            <a:noFill/>
+          </p:spPr>
+          <p:txBody>
+            <a:bodyPr wrap="none" rtlCol="0">
+              <a:spAutoFit/>
+            </a:bodyPr>
+            <a:lstStyle/>
+            <a:p>
+              <a:r>
+                <a:rPr lang="en-US" sz="4000" dirty="0" smtClean="0"/>
+                <a:t>Top</a:t>
+              </a:r>
+              <a:endParaRPr lang="en-US" sz="4000" dirty="0"/>
+            </a:p>
+          </p:txBody>
+        </p:sp>
+        <p:sp>
+          <p:nvSpPr>
+            <p:cNvPr id="14" name="TextBox 13"/>
+            <p:cNvSpPr txBox="1"/>
+            <p:nvPr/>
+          </p:nvSpPr>
+          <p:spPr>
+            <a:xfrm>
+              <a:off x="2220774" y="3107534"/>
+              <a:ext cx="980077" cy="707886"/>
+            </a:xfrm>
+            <a:prstGeom prst="rect">
+              <a:avLst/>
+            </a:prstGeom>
+            <a:noFill/>
+          </p:spPr>
+          <p:txBody>
+            <a:bodyPr wrap="none" rtlCol="0">
+              <a:spAutoFit/>
+            </a:bodyPr>
+            <a:lstStyle/>
+            <a:p>
+              <a:r>
+                <a:rPr lang="en-US" sz="4000" dirty="0" smtClean="0"/>
+                <a:t>Left</a:t>
+              </a:r>
+              <a:endParaRPr lang="en-US" sz="4000" dirty="0"/>
+            </a:p>
+          </p:txBody>
+        </p:sp>
+        <p:sp>
+          <p:nvSpPr>
+            <p:cNvPr id="18" name="TextBox 17"/>
+            <p:cNvSpPr txBox="1"/>
+            <p:nvPr/>
+          </p:nvSpPr>
+          <p:spPr>
+            <a:xfrm>
+              <a:off x="8769199" y="3151270"/>
+              <a:ext cx="1258743" cy="707886"/>
+            </a:xfrm>
+            <a:prstGeom prst="rect">
+              <a:avLst/>
+            </a:prstGeom>
+            <a:noFill/>
+          </p:spPr>
+          <p:txBody>
+            <a:bodyPr wrap="none" rtlCol="0">
+              <a:spAutoFit/>
+            </a:bodyPr>
+            <a:lstStyle/>
+            <a:p>
+              <a:r>
+                <a:rPr lang="en-US" sz="4000" dirty="0" smtClean="0"/>
+                <a:t>Right</a:t>
+              </a:r>
+              <a:endParaRPr lang="en-US" sz="4000" dirty="0"/>
+            </a:p>
+          </p:txBody>
+        </p:sp>
+      </p:grpSp>
     </p:spTree>
     <p:extLst>
       <p:ext uri="{BB962C8B-B14F-4D97-AF65-F5344CB8AC3E}">
@@ -4004,10 +4039,10 @@
         </p:nvGrpSpPr>
         <p:grpSpPr>
           <a:xfrm>
-            <a:off x="1167491" y="0"/>
-            <a:ext cx="10107388" cy="6711043"/>
-            <a:chOff x="1118506" y="706994"/>
-            <a:chExt cx="7228499" cy="4748339"/>
+            <a:off x="1167491" y="521995"/>
+            <a:ext cx="10107388" cy="6189048"/>
+            <a:chOff x="1118506" y="1076327"/>
+            <a:chExt cx="7228499" cy="4379006"/>
           </a:xfrm>
         </p:grpSpPr>
         <p:pic>
@@ -4039,96 +4074,6 @@
             </a:prstGeom>
           </p:spPr>
         </p:pic>
-        <p:sp>
-          <p:nvSpPr>
-            <p:cNvPr id="5" name="TextBox 4"/>
-            <p:cNvSpPr txBox="1"/>
-            <p:nvPr/>
-          </p:nvSpPr>
-          <p:spPr>
-            <a:xfrm>
-              <a:off x="2167813" y="2911000"/>
-              <a:ext cx="301686" cy="369332"/>
-            </a:xfrm>
-            <a:prstGeom prst="rect">
-              <a:avLst/>
-            </a:prstGeom>
-            <a:noFill/>
-          </p:spPr>
-          <p:txBody>
-            <a:bodyPr wrap="none" rtlCol="0">
-              <a:spAutoFit/>
-            </a:bodyPr>
-            <a:lstStyle/>
-            <a:p>
-              <a:r>
-                <a:rPr lang="en-US" dirty="0" smtClean="0"/>
-                <a:t>1</a:t>
-              </a:r>
-              <a:endParaRPr lang="en-US" dirty="0"/>
-            </a:p>
-          </p:txBody>
-        </p:sp>
-        <p:sp>
-          <p:nvSpPr>
-            <p:cNvPr id="6" name="TextBox 5"/>
-            <p:cNvSpPr txBox="1"/>
-            <p:nvPr/>
-          </p:nvSpPr>
-          <p:spPr>
-            <a:xfrm>
-              <a:off x="4572000" y="706994"/>
-              <a:ext cx="301686" cy="369332"/>
-            </a:xfrm>
-            <a:prstGeom prst="rect">
-              <a:avLst/>
-            </a:prstGeom>
-            <a:noFill/>
-          </p:spPr>
-          <p:txBody>
-            <a:bodyPr wrap="none" rtlCol="0">
-              <a:spAutoFit/>
-            </a:bodyPr>
-            <a:lstStyle/>
-            <a:p>
-              <a:r>
-                <a:rPr lang="en-US" dirty="0"/>
-                <a:t>2</a:t>
-              </a:r>
-              <a:endParaRPr lang="en-US" dirty="0"/>
-            </a:p>
-          </p:txBody>
-        </p:sp>
-        <p:sp>
-          <p:nvSpPr>
-            <p:cNvPr id="7" name="TextBox 6"/>
-            <p:cNvSpPr txBox="1"/>
-            <p:nvPr/>
-          </p:nvSpPr>
-          <p:spPr>
-            <a:xfrm>
-              <a:off x="7208283" y="2915865"/>
-              <a:ext cx="301686" cy="369332"/>
-            </a:xfrm>
-            <a:prstGeom prst="rect">
-              <a:avLst/>
-            </a:prstGeom>
-            <a:noFill/>
-          </p:spPr>
-          <p:txBody>
-            <a:bodyPr wrap="none" rtlCol="0">
-              <a:spAutoFit/>
-            </a:bodyPr>
-            <a:lstStyle/>
-            <a:p>
-              <a:r>
-                <a:rPr lang="en-US" dirty="0" smtClean="0"/>
-                <a:t>3</a:t>
-              </a:r>
-              <a:endParaRPr lang="en-US" dirty="0"/>
-            </a:p>
-          </p:txBody>
-        </p:sp>
         <p:sp>
           <p:nvSpPr>
             <p:cNvPr id="10" name="Rectangle 9"/>
@@ -4279,6 +4224,111 @@
             </a:prstGeom>
           </p:spPr>
         </p:pic>
+      </p:grpSp>
+      <p:grpSp>
+        <p:nvGrpSpPr>
+          <p:cNvPr id="19" name="Group 18"/>
+          <p:cNvGrpSpPr/>
+          <p:nvPr/>
+        </p:nvGrpSpPr>
+        <p:grpSpPr>
+          <a:xfrm>
+            <a:off x="2298505" y="-150713"/>
+            <a:ext cx="8096308" cy="3936390"/>
+            <a:chOff x="1961945" y="-115053"/>
+            <a:chExt cx="8096308" cy="3936390"/>
+          </a:xfrm>
+        </p:grpSpPr>
+        <p:sp>
+          <p:nvSpPr>
+            <p:cNvPr id="20" name="TextBox 19"/>
+            <p:cNvSpPr txBox="1"/>
+            <p:nvPr/>
+          </p:nvSpPr>
+          <p:spPr>
+            <a:xfrm>
+              <a:off x="5518600" y="-115053"/>
+              <a:ext cx="929358" cy="707886"/>
+            </a:xfrm>
+            <a:prstGeom prst="rect">
+              <a:avLst/>
+            </a:prstGeom>
+            <a:noFill/>
+          </p:spPr>
+          <p:txBody>
+            <a:bodyPr wrap="none" rtlCol="0">
+              <a:spAutoFit/>
+            </a:bodyPr>
+            <a:lstStyle/>
+            <a:p>
+              <a:r>
+                <a:rPr lang="en-US" sz="4000" dirty="0" smtClean="0"/>
+                <a:t>Top</a:t>
+              </a:r>
+              <a:endParaRPr lang="en-US" sz="4000" dirty="0"/>
+            </a:p>
+          </p:txBody>
+        </p:sp>
+        <p:sp>
+          <p:nvSpPr>
+            <p:cNvPr id="21" name="TextBox 20"/>
+            <p:cNvSpPr txBox="1"/>
+            <p:nvPr/>
+          </p:nvSpPr>
+          <p:spPr>
+            <a:xfrm>
+              <a:off x="1961945" y="3113451"/>
+              <a:ext cx="980077" cy="707886"/>
+            </a:xfrm>
+            <a:prstGeom prst="rect">
+              <a:avLst/>
+            </a:prstGeom>
+            <a:noFill/>
+          </p:spPr>
+          <p:txBody>
+            <a:bodyPr wrap="none" rtlCol="0">
+              <a:spAutoFit/>
+            </a:bodyPr>
+            <a:lstStyle/>
+            <a:p>
+              <a:r>
+                <a:rPr lang="en-US" sz="4000" dirty="0" smtClean="0"/>
+                <a:t>Left</a:t>
+              </a:r>
+              <a:endParaRPr lang="en-US" sz="4000" dirty="0"/>
+            </a:p>
+          </p:txBody>
+        </p:sp>
+        <p:sp>
+          <p:nvSpPr>
+            <p:cNvPr id="22" name="TextBox 21"/>
+            <p:cNvSpPr txBox="1"/>
+            <p:nvPr/>
+          </p:nvSpPr>
+          <p:spPr>
+            <a:xfrm>
+              <a:off x="8799510" y="3113451"/>
+              <a:ext cx="1258743" cy="707886"/>
+            </a:xfrm>
+            <a:prstGeom prst="rect">
+              <a:avLst/>
+            </a:prstGeom>
+            <a:noFill/>
+          </p:spPr>
+          <p:txBody>
+            <a:bodyPr wrap="none" rtlCol="0">
+              <a:spAutoFit/>
+            </a:bodyPr>
+            <a:lstStyle/>
+            <a:p>
+              <a:r>
+                <a:rPr lang="en-US" sz="4000" dirty="0" smtClean="0"/>
+                <a:t>Right</a:t>
+              </a:r>
+              <a:endParaRPr lang="en-US" sz="4000" dirty="0"/>
+            </a:p>
+          </p:txBody>
+        </p:sp>
       </p:grpSp>
     </p:spTree>
     <p:extLst>

</xml_diff>